<commit_message>
update project state presentation
</commit_message>
<xml_diff>
--- a/documents/Project_State.pptx
+++ b/documents/Project_State.pptx
@@ -5,10 +5,10 @@
     <p:sldMasterId id="2147483660" r:id="rId4"/>
   </p:sldMasterIdLst>
   <p:notesMasterIdLst>
-    <p:notesMasterId r:id="rId22"/>
+    <p:notesMasterId r:id="rId21"/>
   </p:notesMasterIdLst>
   <p:handoutMasterIdLst>
-    <p:handoutMasterId r:id="rId23"/>
+    <p:handoutMasterId r:id="rId22"/>
   </p:handoutMasterIdLst>
   <p:sldIdLst>
     <p:sldId id="278" r:id="rId5"/>
@@ -20,14 +20,13 @@
     <p:sldId id="287" r:id="rId11"/>
     <p:sldId id="288" r:id="rId12"/>
     <p:sldId id="290" r:id="rId13"/>
-    <p:sldId id="286" r:id="rId14"/>
-    <p:sldId id="297" r:id="rId15"/>
-    <p:sldId id="299" r:id="rId16"/>
-    <p:sldId id="300" r:id="rId17"/>
-    <p:sldId id="301" r:id="rId18"/>
-    <p:sldId id="304" r:id="rId19"/>
-    <p:sldId id="298" r:id="rId20"/>
-    <p:sldId id="302" r:id="rId21"/>
+    <p:sldId id="297" r:id="rId14"/>
+    <p:sldId id="299" r:id="rId15"/>
+    <p:sldId id="300" r:id="rId16"/>
+    <p:sldId id="301" r:id="rId17"/>
+    <p:sldId id="304" r:id="rId18"/>
+    <p:sldId id="298" r:id="rId19"/>
+    <p:sldId id="302" r:id="rId20"/>
   </p:sldIdLst>
   <p:sldSz cx="12192000" cy="6858000"/>
   <p:notesSz cx="6858000" cy="9144000"/>
@@ -1285,7 +1284,7 @@
           <a:p>
             <a:fld id="{D2761137-B2F4-44A2-AEA9-B8D72975A05F}" type="datetime1">
               <a:rPr lang="de-DE" smtClean="0"/>
-              <a:t>26.09.2022</a:t>
+              <a:t>27.09.2022</a:t>
             </a:fld>
             <a:endParaRPr lang="de-DE" dirty="0"/>
           </a:p>
@@ -1453,7 +1452,7 @@
             <a:pPr rtl="0"/>
             <a:fld id="{E546253B-BE88-45C5-9ABC-A8414C168BD1}" type="datetime1">
               <a:rPr lang="de-DE" noProof="0" smtClean="0"/>
-              <a:t>26.09.2022</a:t>
+              <a:t>27.09.2022</a:t>
             </a:fld>
             <a:endParaRPr lang="de-DE" noProof="0" dirty="0"/>
           </a:p>
@@ -2432,7 +2431,7 @@
             <a:pPr rtl="0"/>
             <a:fld id="{E758FE69-3F99-4550-AA00-A7FF61BF76EA}" type="datetime1">
               <a:rPr lang="de-DE" noProof="0" smtClean="0"/>
-              <a:t>26.09.2022</a:t>
+              <a:t>27.09.2022</a:t>
             </a:fld>
             <a:endParaRPr lang="de-DE" noProof="0" dirty="0"/>
           </a:p>
@@ -2742,7 +2741,7 @@
             <a:pPr rtl="0"/>
             <a:fld id="{B61AEB60-0CF2-4FDF-8809-8AC51494D5F5}" type="datetime1">
               <a:rPr lang="de-DE" noProof="0" smtClean="0"/>
-              <a:t>26.09.2022</a:t>
+              <a:t>27.09.2022</a:t>
             </a:fld>
             <a:endParaRPr lang="de-DE" noProof="0" dirty="0"/>
           </a:p>
@@ -2940,7 +2939,7 @@
             <a:pPr rtl="0"/>
             <a:fld id="{358AF836-13A8-46EF-A2AE-6F658367FD73}" type="datetime1">
               <a:rPr lang="de-DE" noProof="0" smtClean="0"/>
-              <a:t>26.09.2022</a:t>
+              <a:t>27.09.2022</a:t>
             </a:fld>
             <a:endParaRPr lang="de-DE" noProof="0" dirty="0"/>
           </a:p>
@@ -3207,7 +3206,7 @@
             <a:pPr rtl="0"/>
             <a:fld id="{851DFE2F-C573-4D62-882A-E8846EF03C0C}" type="datetime1">
               <a:rPr lang="de-DE" noProof="0" smtClean="0"/>
-              <a:t>26.09.2022</a:t>
+              <a:t>27.09.2022</a:t>
             </a:fld>
             <a:endParaRPr lang="de-DE" noProof="0" dirty="0"/>
           </a:p>
@@ -3647,7 +3646,7 @@
             <a:pPr rtl="0"/>
             <a:fld id="{328E20CA-0CA2-4574-B1D6-69C8C65EED42}" type="datetime1">
               <a:rPr lang="de-DE" noProof="0" smtClean="0"/>
-              <a:t>26.09.2022</a:t>
+              <a:t>27.09.2022</a:t>
             </a:fld>
             <a:endParaRPr lang="de-DE" noProof="0" dirty="0"/>
           </a:p>
@@ -4188,7 +4187,7 @@
             <a:pPr rtl="0"/>
             <a:fld id="{509B9F8F-6639-463B-9FB3-42044123F51F}" type="datetime1">
               <a:rPr lang="de-DE" noProof="0" smtClean="0"/>
-              <a:t>26.09.2022</a:t>
+              <a:t>27.09.2022</a:t>
             </a:fld>
             <a:endParaRPr lang="de-DE" noProof="0" dirty="0"/>
           </a:p>
@@ -5077,7 +5076,7 @@
             <a:pPr rtl="0"/>
             <a:fld id="{069E6A23-504C-403E-B76B-B05505FCD76B}" type="datetime1">
               <a:rPr lang="de-DE" noProof="0" smtClean="0"/>
-              <a:t>26.09.2022</a:t>
+              <a:t>27.09.2022</a:t>
             </a:fld>
             <a:endParaRPr lang="de-DE" noProof="0" dirty="0"/>
           </a:p>
@@ -5251,7 +5250,7 @@
             <a:pPr rtl="0"/>
             <a:fld id="{9468F14C-D4F1-40B6-B1AD-A03EDAA6725D}" type="datetime1">
               <a:rPr lang="de-DE" noProof="0" smtClean="0"/>
-              <a:t>26.09.2022</a:t>
+              <a:t>27.09.2022</a:t>
             </a:fld>
             <a:endParaRPr lang="de-DE" noProof="0" dirty="0"/>
           </a:p>
@@ -5499,7 +5498,7 @@
             <a:pPr rtl="0"/>
             <a:fld id="{AEC8E1CE-31A4-4DC1-9A14-A1FDAD407674}" type="datetime1">
               <a:rPr lang="de-DE" noProof="0" smtClean="0"/>
-              <a:t>26.09.2022</a:t>
+              <a:t>27.09.2022</a:t>
             </a:fld>
             <a:endParaRPr lang="de-DE" noProof="0" dirty="0"/>
           </a:p>
@@ -5745,7 +5744,7 @@
             <a:pPr rtl="0"/>
             <a:fld id="{8FE3744A-5A44-4BFF-92AA-16DA5E94BB83}" type="datetime1">
               <a:rPr lang="de-DE" noProof="0" smtClean="0"/>
-              <a:t>26.09.2022</a:t>
+              <a:t>27.09.2022</a:t>
             </a:fld>
             <a:endParaRPr lang="de-DE" noProof="0" dirty="0"/>
           </a:p>
@@ -6232,7 +6231,7 @@
             <a:pPr rtl="0"/>
             <a:fld id="{6DEDD9AE-23AE-4EB7-B3DB-242A1D8478FB}" type="datetime1">
               <a:rPr lang="de-DE" noProof="0" smtClean="0"/>
-              <a:t>26.09.2022</a:t>
+              <a:t>27.09.2022</a:t>
             </a:fld>
             <a:endParaRPr lang="de-DE" noProof="0" dirty="0"/>
           </a:p>
@@ -6354,7 +6353,7 @@
             <a:pPr rtl="0"/>
             <a:fld id="{BF42FB20-1F3E-43B9-A22C-6B636C25391A}" type="datetime1">
               <a:rPr lang="de-DE" noProof="0" smtClean="0"/>
-              <a:t>26.09.2022</a:t>
+              <a:t>27.09.2022</a:t>
             </a:fld>
             <a:endParaRPr lang="de-DE" noProof="0" dirty="0"/>
           </a:p>
@@ -6452,7 +6451,7 @@
             <a:pPr rtl="0"/>
             <a:fld id="{667D78AD-A707-44D8-98C7-2E5BF17C114E}" type="datetime1">
               <a:rPr lang="de-DE" noProof="0" smtClean="0"/>
-              <a:t>26.09.2022</a:t>
+              <a:t>27.09.2022</a:t>
             </a:fld>
             <a:endParaRPr lang="de-DE" noProof="0" dirty="0"/>
           </a:p>
@@ -6711,7 +6710,7 @@
             <a:pPr rtl="0"/>
             <a:fld id="{B7CDB1FF-C55B-4D31-A515-83B796043DD6}" type="datetime1">
               <a:rPr lang="de-DE" noProof="0" smtClean="0"/>
-              <a:t>26.09.2022</a:t>
+              <a:t>27.09.2022</a:t>
             </a:fld>
             <a:endParaRPr lang="de-DE" noProof="0" dirty="0"/>
           </a:p>
@@ -7023,7 +7022,7 @@
             <a:pPr rtl="0"/>
             <a:fld id="{65B3AE0C-9D3B-493D-AE1C-E837EBD1A420}" type="datetime1">
               <a:rPr lang="de-DE" noProof="0" smtClean="0"/>
-              <a:t>26.09.2022</a:t>
+              <a:t>27.09.2022</a:t>
             </a:fld>
             <a:endParaRPr lang="de-DE" noProof="0" dirty="0"/>
           </a:p>
@@ -7259,7 +7258,7 @@
             <a:pPr rtl="0"/>
             <a:fld id="{68BEABDA-98C7-4D1F-B6BB-CA7E2F630F9B}" type="datetime1">
               <a:rPr lang="de-DE" noProof="0" smtClean="0"/>
-              <a:t>26.09.2022</a:t>
+              <a:t>27.09.2022</a:t>
             </a:fld>
             <a:endParaRPr lang="de-DE" noProof="0" dirty="0"/>
           </a:p>
@@ -8179,7 +8178,7 @@
           </a:effectLst>
           <a:extLst>
             <a:ext uri="{91240B29-F687-4f45-9708-019B960494DF}">
-              <a14:hiddenLine xmlns:p14="http://schemas.microsoft.com/office/powerpoint/2010/main" xmlns:a16="http://schemas.microsoft.com/office/drawing/2014/main" xmlns:a14="http://schemas.microsoft.com/office/drawing/2010/main" xmlns="" w="9525">
+              <a14:hiddenLine xmlns="" xmlns:a14="http://schemas.microsoft.com/office/drawing/2010/main" xmlns:a16="http://schemas.microsoft.com/office/drawing/2014/main" xmlns:p14="http://schemas.microsoft.com/office/powerpoint/2010/main" w="9525">
                 <a:solidFill>
                   <a:srgbClr val="000000"/>
                 </a:solidFill>
@@ -8452,40 +8451,44 @@
           </a:p>
         </p:txBody>
       </p:sp>
-      <p:pic>
-        <p:nvPicPr>
-          <p:cNvPr id="18" name="Grafik 17" descr="Ein Bild, das draußen enthält.&#10;&#10;Automatisch generierte Beschreibung">
+      <p:sp>
+        <p:nvSpPr>
+          <p:cNvPr id="5" name="Textplatzhalter 4">
             <a:extLst>
               <a:ext uri="{FF2B5EF4-FFF2-40B4-BE49-F238E27FC236}">
-                <a16:creationId xmlns:a16="http://schemas.microsoft.com/office/drawing/2014/main" id="{C087FFFD-BC5F-2E79-FCDD-C2D5461024AD}"/>
+                <a16:creationId xmlns:a16="http://schemas.microsoft.com/office/drawing/2014/main" id="{52482089-DD6D-64A8-8377-CEEDD83E0010}"/>
               </a:ext>
             </a:extLst>
           </p:cNvPr>
-          <p:cNvPicPr>
-            <a:picLocks noChangeAspect="1"/>
-          </p:cNvPicPr>
-          <p:nvPr/>
-        </p:nvPicPr>
-        <p:blipFill>
-          <a:blip r:embed="rId2"/>
-          <a:stretch>
-            <a:fillRect/>
-          </a:stretch>
-        </p:blipFill>
+          <p:cNvSpPr>
+            <a:spLocks noGrp="1"/>
+          </p:cNvSpPr>
+          <p:nvPr>
+            <p:ph type="body" sz="quarter" idx="3"/>
+          </p:nvPr>
+        </p:nvSpPr>
         <p:spPr>
           <a:xfrm>
-            <a:off x="5991047" y="2192784"/>
-            <a:ext cx="5003061" cy="2814222"/>
+            <a:off x="5189811" y="1818322"/>
+            <a:ext cx="3300984" cy="764783"/>
           </a:xfrm>
-          <a:prstGeom prst="rect">
-            <a:avLst/>
-          </a:prstGeom>
         </p:spPr>
-      </p:pic>
+        <p:txBody>
+          <a:bodyPr/>
+          <a:lstStyle/>
+          <a:p>
+            <a:r>
+              <a:rPr lang="de-DE" sz="2400" dirty="0"/>
+              <a:t>Website</a:t>
+            </a:r>
+            <a:endParaRPr lang="de-AT" sz="2400" dirty="0"/>
+          </a:p>
+        </p:txBody>
+      </p:sp>
     </p:spTree>
     <p:extLst>
       <p:ext uri="{BB962C8B-B14F-4D97-AF65-F5344CB8AC3E}">
-        <p14:creationId xmlns:p14="http://schemas.microsoft.com/office/powerpoint/2010/main" val="3285426210"/>
+        <p14:creationId xmlns:p14="http://schemas.microsoft.com/office/powerpoint/2010/main" val="3317205872"/>
       </p:ext>
     </p:extLst>
   </p:cSld>
@@ -8648,7 +8651,7 @@
         </p:nvSpPr>
         <p:spPr>
           <a:xfrm>
-            <a:off x="5189811" y="1818322"/>
+            <a:off x="5188276" y="1818322"/>
             <a:ext cx="3300984" cy="764783"/>
           </a:xfrm>
         </p:spPr>
@@ -8664,10 +8667,46 @@
           </a:p>
         </p:txBody>
       </p:sp>
+      <p:sp>
+        <p:nvSpPr>
+          <p:cNvPr id="6" name="Textplatzhalter 5">
+            <a:extLst>
+              <a:ext uri="{FF2B5EF4-FFF2-40B4-BE49-F238E27FC236}">
+                <a16:creationId xmlns:a16="http://schemas.microsoft.com/office/drawing/2014/main" id="{C0D70C41-89E6-9C2B-5C8E-80ACDD8824F5}"/>
+              </a:ext>
+            </a:extLst>
+          </p:cNvPr>
+          <p:cNvSpPr>
+            <a:spLocks noGrp="1"/>
+          </p:cNvSpPr>
+          <p:nvPr>
+            <p:ph type="body" sz="half" idx="16"/>
+          </p:nvPr>
+        </p:nvSpPr>
+        <p:spPr>
+          <a:xfrm>
+            <a:off x="5188276" y="2937153"/>
+            <a:ext cx="3300984" cy="3023088"/>
+          </a:xfrm>
+        </p:spPr>
+        <p:txBody>
+          <a:bodyPr>
+            <a:normAutofit/>
+          </a:bodyPr>
+          <a:lstStyle/>
+          <a:p>
+            <a:r>
+              <a:rPr lang="de-DE" sz="2000" dirty="0" err="1"/>
+              <a:t>Highscoreseite</a:t>
+            </a:r>
+            <a:endParaRPr lang="de-DE" sz="2000" dirty="0"/>
+          </a:p>
+        </p:txBody>
+      </p:sp>
     </p:spTree>
     <p:extLst>
       <p:ext uri="{BB962C8B-B14F-4D97-AF65-F5344CB8AC3E}">
-        <p14:creationId xmlns:p14="http://schemas.microsoft.com/office/powerpoint/2010/main" val="3317205872"/>
+        <p14:creationId xmlns:p14="http://schemas.microsoft.com/office/powerpoint/2010/main" val="4059295168"/>
       </p:ext>
     </p:extLst>
   </p:cSld>
@@ -8880,12 +8919,21 @@
             </a:r>
             <a:endParaRPr lang="de-DE" sz="2000" dirty="0"/>
           </a:p>
+          <a:p>
+            <a:r>
+              <a:rPr lang="de-AT" sz="2000" dirty="0"/>
+              <a:t>Highscore anzeigen</a:t>
+            </a:r>
+          </a:p>
+          <a:p>
+            <a:endParaRPr lang="de-DE" sz="2000" dirty="0"/>
+          </a:p>
         </p:txBody>
       </p:sp>
     </p:spTree>
     <p:extLst>
       <p:ext uri="{BB962C8B-B14F-4D97-AF65-F5344CB8AC3E}">
-        <p14:creationId xmlns:p14="http://schemas.microsoft.com/office/powerpoint/2010/main" val="4059295168"/>
+        <p14:creationId xmlns:p14="http://schemas.microsoft.com/office/powerpoint/2010/main" val="590490742"/>
       </p:ext>
     </p:extLst>
   </p:cSld>
@@ -9103,6 +9151,13 @@
               <a:rPr lang="de-AT" sz="2000" dirty="0"/>
               <a:t>Highscore anzeigen</a:t>
             </a:r>
+            <a:endParaRPr lang="de-DE" sz="2000" dirty="0"/>
+          </a:p>
+          <a:p>
+            <a:r>
+              <a:rPr lang="de-AT" sz="2000" dirty="0"/>
+              <a:t>Hochladen der Highscores </a:t>
+            </a:r>
           </a:p>
           <a:p>
             <a:endParaRPr lang="de-DE" sz="2000" dirty="0"/>
@@ -9112,7 +9167,7 @@
     </p:spTree>
     <p:extLst>
       <p:ext uri="{BB962C8B-B14F-4D97-AF65-F5344CB8AC3E}">
-        <p14:creationId xmlns:p14="http://schemas.microsoft.com/office/powerpoint/2010/main" val="590490742"/>
+        <p14:creationId xmlns:p14="http://schemas.microsoft.com/office/powerpoint/2010/main" val="2136089523"/>
       </p:ext>
     </p:extLst>
   </p:cSld>
@@ -9186,7 +9241,7 @@
         </p:nvSpPr>
         <p:spPr>
           <a:xfrm>
-            <a:off x="976995" y="1818322"/>
+            <a:off x="976995" y="1818321"/>
             <a:ext cx="3300984" cy="764782"/>
           </a:xfrm>
         </p:spPr>
@@ -9275,7 +9330,7 @@
         </p:nvSpPr>
         <p:spPr>
           <a:xfrm>
-            <a:off x="5188276" y="1818322"/>
+            <a:off x="5188276" y="1818321"/>
             <a:ext cx="3300984" cy="764783"/>
           </a:xfrm>
         </p:spPr>
@@ -9296,7 +9351,7 @@
           <p:cNvPr id="6" name="Textplatzhalter 5">
             <a:extLst>
               <a:ext uri="{FF2B5EF4-FFF2-40B4-BE49-F238E27FC236}">
-                <a16:creationId xmlns:a16="http://schemas.microsoft.com/office/drawing/2014/main" id="{C0D70C41-89E6-9C2B-5C8E-80ACDD8824F5}"/>
+                <a16:creationId xmlns:a16="http://schemas.microsoft.com/office/drawing/2014/main" id="{DAB15158-F9B0-F6AF-88A0-B6F938F52E0C}"/>
               </a:ext>
             </a:extLst>
           </p:cNvPr>
@@ -9330,7 +9385,6 @@
               <a:rPr lang="de-AT" sz="2000" dirty="0"/>
               <a:t>Highscore anzeigen</a:t>
             </a:r>
-            <a:endParaRPr lang="de-DE" sz="2000" dirty="0"/>
           </a:p>
           <a:p>
             <a:r>
@@ -9338,15 +9392,46 @@
               <a:t>Hochladen der Highscores </a:t>
             </a:r>
           </a:p>
-          <a:p>
-            <a:endParaRPr lang="de-DE" sz="2000" dirty="0"/>
+        </p:txBody>
+      </p:sp>
+      <p:sp>
+        <p:nvSpPr>
+          <p:cNvPr id="7" name="Textplatzhalter 6">
+            <a:extLst>
+              <a:ext uri="{FF2B5EF4-FFF2-40B4-BE49-F238E27FC236}">
+                <a16:creationId xmlns:a16="http://schemas.microsoft.com/office/drawing/2014/main" id="{C4992709-9348-7F8E-5416-F80590E33EF0}"/>
+              </a:ext>
+            </a:extLst>
+          </p:cNvPr>
+          <p:cNvSpPr>
+            <a:spLocks noGrp="1"/>
+          </p:cNvSpPr>
+          <p:nvPr>
+            <p:ph type="body" sz="quarter" idx="13"/>
+          </p:nvPr>
+        </p:nvSpPr>
+        <p:spPr>
+          <a:xfrm>
+            <a:off x="8592672" y="1818321"/>
+            <a:ext cx="3300984" cy="764782"/>
+          </a:xfrm>
+        </p:spPr>
+        <p:txBody>
+          <a:bodyPr/>
+          <a:lstStyle/>
+          <a:p>
+            <a:r>
+              <a:rPr lang="de-DE" sz="2400" dirty="0"/>
+              <a:t>Publishing</a:t>
+            </a:r>
+            <a:endParaRPr lang="de-AT" dirty="0"/>
           </a:p>
         </p:txBody>
       </p:sp>
     </p:spTree>
     <p:extLst>
       <p:ext uri="{BB962C8B-B14F-4D97-AF65-F5344CB8AC3E}">
-        <p14:creationId xmlns:p14="http://schemas.microsoft.com/office/powerpoint/2010/main" val="2136089523"/>
+        <p14:creationId xmlns:p14="http://schemas.microsoft.com/office/powerpoint/2010/main" val="2529407047"/>
       </p:ext>
     </p:extLst>
   </p:cSld>
@@ -9420,270 +9505,6 @@
         </p:nvSpPr>
         <p:spPr>
           <a:xfrm>
-            <a:off x="976995" y="1818321"/>
-            <a:ext cx="3300984" cy="764782"/>
-          </a:xfrm>
-        </p:spPr>
-        <p:txBody>
-          <a:bodyPr/>
-          <a:lstStyle/>
-          <a:p>
-            <a:r>
-              <a:rPr lang="de-DE" sz="2400" dirty="0"/>
-              <a:t>Game</a:t>
-            </a:r>
-            <a:endParaRPr lang="de-AT" dirty="0"/>
-          </a:p>
-        </p:txBody>
-      </p:sp>
-      <p:sp>
-        <p:nvSpPr>
-          <p:cNvPr id="4" name="Textplatzhalter 3">
-            <a:extLst>
-              <a:ext uri="{FF2B5EF4-FFF2-40B4-BE49-F238E27FC236}">
-                <a16:creationId xmlns:a16="http://schemas.microsoft.com/office/drawing/2014/main" id="{6C1C50FE-6182-E800-A177-3519AF8B6230}"/>
-              </a:ext>
-            </a:extLst>
-          </p:cNvPr>
-          <p:cNvSpPr>
-            <a:spLocks noGrp="1"/>
-          </p:cNvSpPr>
-          <p:nvPr>
-            <p:ph type="body" sz="half" idx="15"/>
-          </p:nvPr>
-        </p:nvSpPr>
-        <p:spPr>
-          <a:xfrm>
-            <a:off x="-98260" y="2821377"/>
-            <a:ext cx="5451494" cy="3023088"/>
-          </a:xfrm>
-        </p:spPr>
-        <p:txBody>
-          <a:bodyPr>
-            <a:normAutofit/>
-          </a:bodyPr>
-          <a:lstStyle/>
-          <a:p>
-            <a:r>
-              <a:rPr lang="de-DE" sz="2000" dirty="0"/>
-              <a:t>Richtige Modelle für Spieler, Items, etc.</a:t>
-            </a:r>
-          </a:p>
-          <a:p>
-            <a:r>
-              <a:rPr lang="de-DE" sz="2000" dirty="0"/>
-              <a:t>Mehr Puzzles</a:t>
-            </a:r>
-          </a:p>
-          <a:p>
-            <a:r>
-              <a:rPr lang="de-DE" sz="2000" dirty="0" err="1"/>
-              <a:t>Worldbuilding</a:t>
-            </a:r>
-            <a:endParaRPr lang="de-DE" sz="2000" dirty="0"/>
-          </a:p>
-          <a:p>
-            <a:r>
-              <a:rPr lang="de-DE" sz="2000" dirty="0"/>
-              <a:t>Kommunikationsmöglichkeit der Spieler einfügen</a:t>
-            </a:r>
-            <a:endParaRPr lang="de-AT" sz="2000" dirty="0"/>
-          </a:p>
-        </p:txBody>
-      </p:sp>
-      <p:sp>
-        <p:nvSpPr>
-          <p:cNvPr id="5" name="Textplatzhalter 4">
-            <a:extLst>
-              <a:ext uri="{FF2B5EF4-FFF2-40B4-BE49-F238E27FC236}">
-                <a16:creationId xmlns:a16="http://schemas.microsoft.com/office/drawing/2014/main" id="{52482089-DD6D-64A8-8377-CEEDD83E0010}"/>
-              </a:ext>
-            </a:extLst>
-          </p:cNvPr>
-          <p:cNvSpPr>
-            <a:spLocks noGrp="1"/>
-          </p:cNvSpPr>
-          <p:nvPr>
-            <p:ph type="body" sz="quarter" idx="3"/>
-          </p:nvPr>
-        </p:nvSpPr>
-        <p:spPr>
-          <a:xfrm>
-            <a:off x="5188276" y="1818321"/>
-            <a:ext cx="3300984" cy="764783"/>
-          </a:xfrm>
-        </p:spPr>
-        <p:txBody>
-          <a:bodyPr/>
-          <a:lstStyle/>
-          <a:p>
-            <a:r>
-              <a:rPr lang="de-DE" sz="2400" dirty="0"/>
-              <a:t>Website</a:t>
-            </a:r>
-            <a:endParaRPr lang="de-AT" sz="2400" dirty="0"/>
-          </a:p>
-        </p:txBody>
-      </p:sp>
-      <p:sp>
-        <p:nvSpPr>
-          <p:cNvPr id="6" name="Textplatzhalter 5">
-            <a:extLst>
-              <a:ext uri="{FF2B5EF4-FFF2-40B4-BE49-F238E27FC236}">
-                <a16:creationId xmlns:a16="http://schemas.microsoft.com/office/drawing/2014/main" id="{DAB15158-F9B0-F6AF-88A0-B6F938F52E0C}"/>
-              </a:ext>
-            </a:extLst>
-          </p:cNvPr>
-          <p:cNvSpPr>
-            <a:spLocks noGrp="1"/>
-          </p:cNvSpPr>
-          <p:nvPr>
-            <p:ph type="body" sz="half" idx="16"/>
-          </p:nvPr>
-        </p:nvSpPr>
-        <p:spPr>
-          <a:xfrm>
-            <a:off x="5188276" y="2937153"/>
-            <a:ext cx="3300984" cy="3023088"/>
-          </a:xfrm>
-        </p:spPr>
-        <p:txBody>
-          <a:bodyPr>
-            <a:normAutofit/>
-          </a:bodyPr>
-          <a:lstStyle/>
-          <a:p>
-            <a:r>
-              <a:rPr lang="de-DE" sz="2000" dirty="0" err="1"/>
-              <a:t>Highscoreseite</a:t>
-            </a:r>
-            <a:endParaRPr lang="de-DE" sz="2000" dirty="0"/>
-          </a:p>
-          <a:p>
-            <a:r>
-              <a:rPr lang="de-AT" sz="2000" dirty="0"/>
-              <a:t>Highscore anzeigen</a:t>
-            </a:r>
-          </a:p>
-          <a:p>
-            <a:r>
-              <a:rPr lang="de-AT" sz="2000" dirty="0"/>
-              <a:t>Hochladen der Highscores </a:t>
-            </a:r>
-          </a:p>
-        </p:txBody>
-      </p:sp>
-      <p:sp>
-        <p:nvSpPr>
-          <p:cNvPr id="7" name="Textplatzhalter 6">
-            <a:extLst>
-              <a:ext uri="{FF2B5EF4-FFF2-40B4-BE49-F238E27FC236}">
-                <a16:creationId xmlns:a16="http://schemas.microsoft.com/office/drawing/2014/main" id="{C4992709-9348-7F8E-5416-F80590E33EF0}"/>
-              </a:ext>
-            </a:extLst>
-          </p:cNvPr>
-          <p:cNvSpPr>
-            <a:spLocks noGrp="1"/>
-          </p:cNvSpPr>
-          <p:nvPr>
-            <p:ph type="body" sz="quarter" idx="13"/>
-          </p:nvPr>
-        </p:nvSpPr>
-        <p:spPr>
-          <a:xfrm>
-            <a:off x="8592672" y="1818321"/>
-            <a:ext cx="3300984" cy="764782"/>
-          </a:xfrm>
-        </p:spPr>
-        <p:txBody>
-          <a:bodyPr/>
-          <a:lstStyle/>
-          <a:p>
-            <a:r>
-              <a:rPr lang="de-DE" sz="2400" dirty="0"/>
-              <a:t>Publishing</a:t>
-            </a:r>
-            <a:endParaRPr lang="de-AT" dirty="0"/>
-          </a:p>
-        </p:txBody>
-      </p:sp>
-    </p:spTree>
-    <p:extLst>
-      <p:ext uri="{BB962C8B-B14F-4D97-AF65-F5344CB8AC3E}">
-        <p14:creationId xmlns:p14="http://schemas.microsoft.com/office/powerpoint/2010/main" val="2529407047"/>
-      </p:ext>
-    </p:extLst>
-  </p:cSld>
-  <p:clrMapOvr>
-    <a:masterClrMapping/>
-  </p:clrMapOvr>
-</p:sld>
-</file>
-
-<file path=ppt/slides/slide16.xml><?xml version="1.0" encoding="utf-8"?>
-<p:sld xmlns:a="http://schemas.openxmlformats.org/drawingml/2006/main" xmlns:r="http://schemas.openxmlformats.org/officeDocument/2006/relationships" xmlns:p="http://schemas.openxmlformats.org/presentationml/2006/main">
-  <p:cSld>
-    <p:spTree>
-      <p:nvGrpSpPr>
-        <p:cNvPr id="1" name=""/>
-        <p:cNvGrpSpPr/>
-        <p:nvPr/>
-      </p:nvGrpSpPr>
-      <p:grpSpPr>
-        <a:xfrm>
-          <a:off x="0" y="0"/>
-          <a:ext cx="0" cy="0"/>
-          <a:chOff x="0" y="0"/>
-          <a:chExt cx="0" cy="0"/>
-        </a:xfrm>
-      </p:grpSpPr>
-      <p:sp>
-        <p:nvSpPr>
-          <p:cNvPr id="2" name="Titel 1">
-            <a:extLst>
-              <a:ext uri="{FF2B5EF4-FFF2-40B4-BE49-F238E27FC236}">
-                <a16:creationId xmlns:a16="http://schemas.microsoft.com/office/drawing/2014/main" id="{C41E20FE-EFB2-6B32-53C6-7D1D051B9304}"/>
-              </a:ext>
-            </a:extLst>
-          </p:cNvPr>
-          <p:cNvSpPr>
-            <a:spLocks noGrp="1"/>
-          </p:cNvSpPr>
-          <p:nvPr>
-            <p:ph type="title"/>
-          </p:nvPr>
-        </p:nvSpPr>
-        <p:spPr/>
-        <p:txBody>
-          <a:bodyPr/>
-          <a:lstStyle/>
-          <a:p>
-            <a:r>
-              <a:rPr lang="de-DE" dirty="0"/>
-              <a:t>Zukunftsplanung</a:t>
-            </a:r>
-            <a:endParaRPr lang="de-AT" dirty="0"/>
-          </a:p>
-        </p:txBody>
-      </p:sp>
-      <p:sp>
-        <p:nvSpPr>
-          <p:cNvPr id="3" name="Textplatzhalter 2">
-            <a:extLst>
-              <a:ext uri="{FF2B5EF4-FFF2-40B4-BE49-F238E27FC236}">
-                <a16:creationId xmlns:a16="http://schemas.microsoft.com/office/drawing/2014/main" id="{F8252F70-DCF5-EC04-25B5-8CD4BCA66C59}"/>
-              </a:ext>
-            </a:extLst>
-          </p:cNvPr>
-          <p:cNvSpPr>
-            <a:spLocks noGrp="1"/>
-          </p:cNvSpPr>
-          <p:nvPr>
-            <p:ph type="body" idx="1"/>
-          </p:nvPr>
-        </p:nvSpPr>
-        <p:spPr>
-          <a:xfrm>
             <a:off x="976995" y="1818322"/>
             <a:ext cx="3300984" cy="764782"/>
           </a:xfrm>
@@ -9919,7 +9740,7 @@
 </p:sld>
 </file>
 
-<file path=ppt/slides/slide17.xml><?xml version="1.0" encoding="utf-8"?>
+<file path=ppt/slides/slide16.xml><?xml version="1.0" encoding="utf-8"?>
 <p:sld xmlns:a="http://schemas.openxmlformats.org/drawingml/2006/main" xmlns:r="http://schemas.openxmlformats.org/officeDocument/2006/relationships" xmlns:p="http://schemas.openxmlformats.org/presentationml/2006/main">
   <p:cSld>
     <p:spTree>
@@ -12263,6 +12084,15 @@
 </file>
 
 <file path=customXml/item1.xml><?xml version="1.0" encoding="utf-8"?>
+<?mso-contentType ?>
+<FormTemplates xmlns="http://schemas.microsoft.com/sharepoint/v3/contenttype/forms">
+  <Display>DocumentLibraryForm</Display>
+  <Edit>DocumentLibraryForm</Edit>
+  <New>DocumentLibraryForm</New>
+</FormTemplates>
+</file>
+
+<file path=customXml/item2.xml><?xml version="1.0" encoding="utf-8"?>
 <ct:contentTypeSchema xmlns:ct="http://schemas.microsoft.com/office/2006/metadata/contentType" xmlns:ma="http://schemas.microsoft.com/office/2006/metadata/properties/metaAttributes" ct:_="" ma:_="" ma:contentTypeName="Document" ma:contentTypeID="0x01010079F111ED35F8CC479449609E8A0923A6" ma:contentTypeVersion="12" ma:contentTypeDescription="Create a new document." ma:contentTypeScope="" ma:versionID="a410dd7f93c95333ffa1b60ed6adedd1">
   <xsd:schema xmlns:xsd="http://www.w3.org/2001/XMLSchema" xmlns:xs="http://www.w3.org/2001/XMLSchema" xmlns:p="http://schemas.microsoft.com/office/2006/metadata/properties" xmlns:ns2="71af3243-3dd4-4a8d-8c0d-dd76da1f02a5" xmlns:ns3="16c05727-aa75-4e4a-9b5f-8a80a1165891" targetNamespace="http://schemas.microsoft.com/office/2006/metadata/properties" ma:root="true" ma:fieldsID="a936d9baba76aa3866493feff160faab" ns2:_="" ns3:_="">
     <xsd:import namespace="71af3243-3dd4-4a8d-8c0d-dd76da1f02a5"/>
@@ -12483,15 +12313,6 @@
 </ct:contentTypeSchema>
 </file>
 
-<file path=customXml/item2.xml><?xml version="1.0" encoding="utf-8"?>
-<?mso-contentType ?>
-<FormTemplates xmlns="http://schemas.microsoft.com/sharepoint/v3/contenttype/forms">
-  <Display>DocumentLibraryForm</Display>
-  <Edit>DocumentLibraryForm</Edit>
-  <New>DocumentLibraryForm</New>
-</FormTemplates>
-</file>
-
 <file path=customXml/item3.xml><?xml version="1.0" encoding="utf-8"?>
 <p:properties xmlns:p="http://schemas.microsoft.com/office/2006/metadata/properties" xmlns:xsi="http://www.w3.org/2001/XMLSchema-instance" xmlns:pc="http://schemas.microsoft.com/office/infopath/2007/PartnerControls">
   <documentManagement>
@@ -12502,6 +12323,14 @@
 </file>
 
 <file path=customXml/itemProps1.xml><?xml version="1.0" encoding="utf-8"?>
+<ds:datastoreItem xmlns:ds="http://schemas.openxmlformats.org/officeDocument/2006/customXml" ds:itemID="{64B270AB-C138-415C-897E-3C24487DECF1}">
+  <ds:schemaRefs>
+    <ds:schemaRef ds:uri="http://schemas.microsoft.com/sharepoint/v3/contenttype/forms"/>
+  </ds:schemaRefs>
+</ds:datastoreItem>
+</file>
+
+<file path=customXml/itemProps2.xml><?xml version="1.0" encoding="utf-8"?>
 <ds:datastoreItem xmlns:ds="http://schemas.openxmlformats.org/officeDocument/2006/customXml" ds:itemID="{0585E981-8C91-4205-A0C3-C991F42B4C9E}">
   <ds:schemaRefs>
     <ds:schemaRef ds:uri="http://schemas.microsoft.com/office/2006/metadata/contentType"/>
@@ -12520,14 +12349,6 @@
 </ds:datastoreItem>
 </file>
 
-<file path=customXml/itemProps2.xml><?xml version="1.0" encoding="utf-8"?>
-<ds:datastoreItem xmlns:ds="http://schemas.openxmlformats.org/officeDocument/2006/customXml" ds:itemID="{64B270AB-C138-415C-897E-3C24487DECF1}">
-  <ds:schemaRefs>
-    <ds:schemaRef ds:uri="http://schemas.microsoft.com/sharepoint/v3/contenttype/forms"/>
-  </ds:schemaRefs>
-</ds:datastoreItem>
-</file>
-
 <file path=customXml/itemProps3.xml><?xml version="1.0" encoding="utf-8"?>
 <ds:datastoreItem xmlns:ds="http://schemas.openxmlformats.org/officeDocument/2006/customXml" ds:itemID="{2C4C00F4-06E9-43E3-AD97-88A857CEFA82}">
   <ds:schemaRefs>

</xml_diff>